<commit_message>
package structure overview updated
</commit_message>
<xml_diff>
--- a/vignettes/PackageSchematic.pptx
+++ b/vignettes/PackageSchematic.pptx
@@ -254,7 +254,7 @@
           <a:p>
             <a:fld id="{300DB245-849F-4AAA-AD3E-676A6FA9CB3B}" type="datetimeFigureOut">
               <a:rPr lang="de-DE" smtClean="0"/>
-              <a:t>21.01.2017</a:t>
+              <a:t>25.03.2017</a:t>
             </a:fld>
             <a:endParaRPr lang="de-DE"/>
           </a:p>
@@ -424,7 +424,7 @@
           <a:p>
             <a:fld id="{300DB245-849F-4AAA-AD3E-676A6FA9CB3B}" type="datetimeFigureOut">
               <a:rPr lang="de-DE" smtClean="0"/>
-              <a:t>21.01.2017</a:t>
+              <a:t>25.03.2017</a:t>
             </a:fld>
             <a:endParaRPr lang="de-DE"/>
           </a:p>
@@ -604,7 +604,7 @@
           <a:p>
             <a:fld id="{300DB245-849F-4AAA-AD3E-676A6FA9CB3B}" type="datetimeFigureOut">
               <a:rPr lang="de-DE" smtClean="0"/>
-              <a:t>21.01.2017</a:t>
+              <a:t>25.03.2017</a:t>
             </a:fld>
             <a:endParaRPr lang="de-DE"/>
           </a:p>
@@ -774,7 +774,7 @@
           <a:p>
             <a:fld id="{300DB245-849F-4AAA-AD3E-676A6FA9CB3B}" type="datetimeFigureOut">
               <a:rPr lang="de-DE" smtClean="0"/>
-              <a:t>21.01.2017</a:t>
+              <a:t>25.03.2017</a:t>
             </a:fld>
             <a:endParaRPr lang="de-DE"/>
           </a:p>
@@ -1020,7 +1020,7 @@
           <a:p>
             <a:fld id="{300DB245-849F-4AAA-AD3E-676A6FA9CB3B}" type="datetimeFigureOut">
               <a:rPr lang="de-DE" smtClean="0"/>
-              <a:t>21.01.2017</a:t>
+              <a:t>25.03.2017</a:t>
             </a:fld>
             <a:endParaRPr lang="de-DE"/>
           </a:p>
@@ -1252,7 +1252,7 @@
           <a:p>
             <a:fld id="{300DB245-849F-4AAA-AD3E-676A6FA9CB3B}" type="datetimeFigureOut">
               <a:rPr lang="de-DE" smtClean="0"/>
-              <a:t>21.01.2017</a:t>
+              <a:t>25.03.2017</a:t>
             </a:fld>
             <a:endParaRPr lang="de-DE"/>
           </a:p>
@@ -1619,7 +1619,7 @@
           <a:p>
             <a:fld id="{300DB245-849F-4AAA-AD3E-676A6FA9CB3B}" type="datetimeFigureOut">
               <a:rPr lang="de-DE" smtClean="0"/>
-              <a:t>21.01.2017</a:t>
+              <a:t>25.03.2017</a:t>
             </a:fld>
             <a:endParaRPr lang="de-DE"/>
           </a:p>
@@ -1737,7 +1737,7 @@
           <a:p>
             <a:fld id="{300DB245-849F-4AAA-AD3E-676A6FA9CB3B}" type="datetimeFigureOut">
               <a:rPr lang="de-DE" smtClean="0"/>
-              <a:t>21.01.2017</a:t>
+              <a:t>25.03.2017</a:t>
             </a:fld>
             <a:endParaRPr lang="de-DE"/>
           </a:p>
@@ -1832,7 +1832,7 @@
           <a:p>
             <a:fld id="{300DB245-849F-4AAA-AD3E-676A6FA9CB3B}" type="datetimeFigureOut">
               <a:rPr lang="de-DE" smtClean="0"/>
-              <a:t>21.01.2017</a:t>
+              <a:t>25.03.2017</a:t>
             </a:fld>
             <a:endParaRPr lang="de-DE"/>
           </a:p>
@@ -2109,7 +2109,7 @@
           <a:p>
             <a:fld id="{300DB245-849F-4AAA-AD3E-676A6FA9CB3B}" type="datetimeFigureOut">
               <a:rPr lang="de-DE" smtClean="0"/>
-              <a:t>21.01.2017</a:t>
+              <a:t>25.03.2017</a:t>
             </a:fld>
             <a:endParaRPr lang="de-DE"/>
           </a:p>
@@ -2366,7 +2366,7 @@
           <a:p>
             <a:fld id="{300DB245-849F-4AAA-AD3E-676A6FA9CB3B}" type="datetimeFigureOut">
               <a:rPr lang="de-DE" smtClean="0"/>
-              <a:t>21.01.2017</a:t>
+              <a:t>25.03.2017</a:t>
             </a:fld>
             <a:endParaRPr lang="de-DE"/>
           </a:p>
@@ -2579,7 +2579,7 @@
           <a:p>
             <a:fld id="{300DB245-849F-4AAA-AD3E-676A6FA9CB3B}" type="datetimeFigureOut">
               <a:rPr lang="de-DE" smtClean="0"/>
-              <a:t>21.01.2017</a:t>
+              <a:t>25.03.2017</a:t>
             </a:fld>
             <a:endParaRPr lang="de-DE"/>
           </a:p>
@@ -3714,100 +3714,18 @@
           </a:fontRef>
         </p:style>
       </p:cxnSp>
-      <p:sp>
-        <p:nvSpPr>
-          <p:cNvPr id="216" name="Rechteck 215"/>
-          <p:cNvSpPr/>
-          <p:nvPr/>
-        </p:nvSpPr>
-        <p:spPr>
-          <a:xfrm>
-            <a:off x="4927090" y="1089865"/>
-            <a:ext cx="1739709" cy="1200329"/>
-          </a:xfrm>
-          <a:prstGeom prst="rect">
-            <a:avLst/>
-          </a:prstGeom>
-          <a:ln>
-            <a:solidFill>
-              <a:schemeClr val="bg1">
-                <a:lumMod val="50000"/>
-              </a:schemeClr>
-            </a:solidFill>
-          </a:ln>
-        </p:spPr>
-        <p:txBody>
-          <a:bodyPr wrap="square">
-            <a:spAutoFit/>
-          </a:bodyPr>
-          <a:lstStyle/>
-          <a:p>
-            <a:r>
-              <a:rPr lang="de-DE" b="1"/>
-              <a:t>id</a:t>
-            </a:r>
-            <a:r>
-              <a:rPr lang="de-DE"/>
-              <a:t> / name,</a:t>
-            </a:r>
-          </a:p>
-          <a:p>
-            <a:r>
-              <a:rPr lang="de-DE" b="1" smtClean="0"/>
-              <a:t>res</a:t>
-            </a:r>
-            <a:r>
-              <a:rPr lang="de-DE" b="1"/>
-              <a:t>, var, per</a:t>
-            </a:r>
-            <a:r>
-              <a:rPr lang="de-DE"/>
-              <a:t>,</a:t>
-            </a:r>
-          </a:p>
-          <a:p>
-            <a:r>
-              <a:rPr lang="de-DE" smtClean="0"/>
-              <a:t>base, </a:t>
-            </a:r>
-            <a:r>
-              <a:rPr lang="de-DE" smtClean="0"/>
-              <a:t>findex</a:t>
-            </a:r>
-            <a:r>
-              <a:rPr lang="de-DE"/>
-              <a:t>,</a:t>
-            </a:r>
-          </a:p>
-          <a:p>
-            <a:r>
-              <a:rPr lang="de-DE" smtClean="0"/>
-              <a:t>current?, </a:t>
-            </a:r>
-            <a:r>
-              <a:rPr lang="de-DE" b="1" smtClean="0"/>
-              <a:t>meta</a:t>
-            </a:r>
-            <a:r>
-              <a:rPr lang="de-DE" b="1"/>
-              <a:t>?</a:t>
-            </a:r>
-          </a:p>
-        </p:txBody>
-      </p:sp>
       <p:cxnSp>
         <p:nvCxnSpPr>
           <p:cNvPr id="217" name="Gerade Verbindung mit Pfeil 216"/>
           <p:cNvCxnSpPr>
-            <a:stCxn id="216" idx="2"/>
             <a:endCxn id="211" idx="0"/>
           </p:cNvCxnSpPr>
           <p:nvPr/>
         </p:nvCxnSpPr>
         <p:spPr>
-          <a:xfrm flipH="1">
-            <a:off x="5791279" y="2290194"/>
-            <a:ext cx="5666" cy="228376"/>
+          <a:xfrm>
+            <a:off x="5791278" y="2038734"/>
+            <a:ext cx="1" cy="479836"/>
           </a:xfrm>
           <a:prstGeom prst="straightConnector1">
             <a:avLst/>
@@ -3928,7 +3846,7 @@
           <a:p>
             <a:pPr algn="ctr"/>
             <a:r>
-              <a:rPr lang="de-DE" sz="3200">
+              <a:rPr lang="de-DE" sz="3200" smtClean="0">
                 <a:solidFill>
                   <a:schemeClr val="accent6">
                     <a:lumMod val="60000"/>
@@ -3936,8 +3854,16 @@
                   </a:schemeClr>
                 </a:solidFill>
               </a:rPr>
-              <a:t>geoIndex</a:t>
-            </a:r>
+              <a:t>geoIndexAll</a:t>
+            </a:r>
+            <a:endParaRPr lang="de-DE" sz="3200">
+              <a:solidFill>
+                <a:schemeClr val="accent6">
+                  <a:lumMod val="60000"/>
+                  <a:lumOff val="40000"/>
+                </a:schemeClr>
+              </a:solidFill>
+            </a:endParaRPr>
           </a:p>
         </p:txBody>
       </p:sp>
@@ -3949,7 +3875,7 @@
         </p:nvSpPr>
         <p:spPr>
           <a:xfrm>
-            <a:off x="2768110" y="1692900"/>
+            <a:off x="2578950" y="832761"/>
             <a:ext cx="1445269" cy="396000"/>
           </a:xfrm>
           <a:prstGeom prst="roundRect">
@@ -4004,7 +3930,7 @@
         </p:nvSpPr>
         <p:spPr>
           <a:xfrm>
-            <a:off x="2455374" y="810877"/>
+            <a:off x="2261892" y="1392403"/>
             <a:ext cx="2079385" cy="646331"/>
           </a:xfrm>
           <a:prstGeom prst="rect">
@@ -4046,15 +3972,15 @@
         <p:nvCxnSpPr>
           <p:cNvPr id="222" name="Gerade Verbindung mit Pfeil 221"/>
           <p:cNvCxnSpPr>
-            <a:stCxn id="221" idx="2"/>
-            <a:endCxn id="220" idx="0"/>
+            <a:stCxn id="221" idx="0"/>
+            <a:endCxn id="220" idx="2"/>
           </p:cNvCxnSpPr>
           <p:nvPr/>
         </p:nvCxnSpPr>
         <p:spPr>
-          <a:xfrm flipH="1">
-            <a:off x="3490745" y="1457208"/>
-            <a:ext cx="4322" cy="235692"/>
+          <a:xfrm flipV="1">
+            <a:off x="3301585" y="1228761"/>
+            <a:ext cx="0" cy="163642"/>
           </a:xfrm>
           <a:prstGeom prst="straightConnector1">
             <a:avLst/>
@@ -4171,14 +4097,14 @@
       </p:cxnSp>
       <p:sp>
         <p:nvSpPr>
-          <p:cNvPr id="225" name="Abgerundetes Rechteck 224"/>
+          <p:cNvPr id="228" name="Abgerundetes Rechteck 227"/>
           <p:cNvSpPr/>
           <p:nvPr/>
         </p:nvSpPr>
         <p:spPr>
           <a:xfrm>
-            <a:off x="7067730" y="1274014"/>
-            <a:ext cx="1829166" cy="1065205"/>
+            <a:off x="2446745" y="3916502"/>
+            <a:ext cx="2088000" cy="396000"/>
           </a:xfrm>
           <a:prstGeom prst="roundRect">
             <a:avLst/>
@@ -4216,35 +4142,38 @@
             <a:r>
               <a:rPr lang="de-DE" sz="3200">
                 <a:solidFill>
-                  <a:schemeClr val="accent2"/>
+                  <a:schemeClr val="accent6">
+                    <a:lumMod val="60000"/>
+                    <a:lumOff val="40000"/>
+                  </a:schemeClr>
                 </a:solidFill>
               </a:rPr>
-              <a:t>dirDWD</a:t>
-            </a:r>
-          </a:p>
-          <a:p>
-            <a:pPr algn="ctr"/>
-            <a:r>
-              <a:rPr lang="de-DE" sz="3200">
-                <a:solidFill>
-                  <a:schemeClr val="accent2"/>
-                </a:solidFill>
-              </a:rPr>
-              <a:t>fileDWD</a:t>
-            </a:r>
+              <a:t>geoIndex</a:t>
+            </a:r>
+            <a:endParaRPr lang="de-DE" sz="3200">
+              <a:solidFill>
+                <a:schemeClr val="accent6">
+                  <a:lumMod val="60000"/>
+                  <a:lumOff val="40000"/>
+                </a:schemeClr>
+              </a:solidFill>
+            </a:endParaRPr>
           </a:p>
         </p:txBody>
       </p:sp>
       <p:cxnSp>
         <p:nvCxnSpPr>
-          <p:cNvPr id="226" name="Gerade Verbindung mit Pfeil 225"/>
-          <p:cNvCxnSpPr/>
+          <p:cNvPr id="229" name="Gerade Verbindung mit Pfeil 228"/>
+          <p:cNvCxnSpPr>
+            <a:stCxn id="219" idx="2"/>
+            <a:endCxn id="228" idx="0"/>
+          </p:cNvCxnSpPr>
           <p:nvPr/>
         </p:nvCxnSpPr>
         <p:spPr>
           <a:xfrm flipH="1">
-            <a:off x="6759971" y="2285298"/>
-            <a:ext cx="357510" cy="1199281"/>
+            <a:off x="3490755" y="3701963"/>
+            <a:ext cx="8619" cy="214541"/>
           </a:xfrm>
           <a:prstGeom prst="straightConnector1">
             <a:avLst/>
@@ -4273,55 +4202,15 @@
           </a:fontRef>
         </p:style>
       </p:cxnSp>
-      <p:cxnSp>
-        <p:nvCxnSpPr>
-          <p:cNvPr id="227" name="Gerade Verbindung mit Pfeil 226"/>
-          <p:cNvCxnSpPr>
-            <a:stCxn id="220" idx="3"/>
-          </p:cNvCxnSpPr>
-          <p:nvPr/>
-        </p:nvCxnSpPr>
-        <p:spPr>
-          <a:xfrm flipV="1">
-            <a:off x="4213385" y="1274017"/>
-            <a:ext cx="779669" cy="616883"/>
-          </a:xfrm>
-          <a:prstGeom prst="straightConnector1">
-            <a:avLst/>
-          </a:prstGeom>
-          <a:ln>
-            <a:solidFill>
-              <a:schemeClr val="bg1">
-                <a:lumMod val="50000"/>
-              </a:schemeClr>
-            </a:solidFill>
-            <a:tailEnd type="triangle"/>
-          </a:ln>
-        </p:spPr>
-        <p:style>
-          <a:lnRef idx="1">
-            <a:schemeClr val="accent2"/>
-          </a:lnRef>
-          <a:fillRef idx="0">
-            <a:schemeClr val="accent2"/>
-          </a:fillRef>
-          <a:effectRef idx="0">
-            <a:schemeClr val="accent2"/>
-          </a:effectRef>
-          <a:fontRef idx="minor">
-            <a:schemeClr val="tx1"/>
-          </a:fontRef>
-        </p:style>
-      </p:cxnSp>
-      <p:sp>
-        <p:nvSpPr>
-          <p:cNvPr id="228" name="Abgerundetes Rechteck 227"/>
+      <p:sp>
+        <p:nvSpPr>
+          <p:cNvPr id="230" name="Abgerundetes Rechteck 229"/>
           <p:cNvSpPr/>
           <p:nvPr/>
         </p:nvSpPr>
         <p:spPr>
           <a:xfrm>
-            <a:off x="2446745" y="3916502"/>
+            <a:off x="99746" y="3440876"/>
             <a:ext cx="2088000" cy="396000"/>
           </a:xfrm>
           <a:prstGeom prst="roundRect">
@@ -4360,105 +4249,6 @@
             <a:r>
               <a:rPr lang="de-DE" sz="3200">
                 <a:solidFill>
-                  <a:schemeClr val="accent6">
-                    <a:lumMod val="60000"/>
-                    <a:lumOff val="40000"/>
-                  </a:schemeClr>
-                </a:solidFill>
-              </a:rPr>
-              <a:t>mapDWD</a:t>
-            </a:r>
-          </a:p>
-        </p:txBody>
-      </p:sp>
-      <p:cxnSp>
-        <p:nvCxnSpPr>
-          <p:cNvPr id="229" name="Gerade Verbindung mit Pfeil 228"/>
-          <p:cNvCxnSpPr>
-            <a:stCxn id="219" idx="2"/>
-            <a:endCxn id="228" idx="0"/>
-          </p:cNvCxnSpPr>
-          <p:nvPr/>
-        </p:nvCxnSpPr>
-        <p:spPr>
-          <a:xfrm flipH="1">
-            <a:off x="3490755" y="3701963"/>
-            <a:ext cx="8619" cy="214541"/>
-          </a:xfrm>
-          <a:prstGeom prst="straightConnector1">
-            <a:avLst/>
-          </a:prstGeom>
-          <a:ln>
-            <a:solidFill>
-              <a:schemeClr val="bg1">
-                <a:lumMod val="50000"/>
-              </a:schemeClr>
-            </a:solidFill>
-            <a:tailEnd type="triangle"/>
-          </a:ln>
-        </p:spPr>
-        <p:style>
-          <a:lnRef idx="1">
-            <a:schemeClr val="accent2"/>
-          </a:lnRef>
-          <a:fillRef idx="0">
-            <a:schemeClr val="accent2"/>
-          </a:fillRef>
-          <a:effectRef idx="0">
-            <a:schemeClr val="accent2"/>
-          </a:effectRef>
-          <a:fontRef idx="minor">
-            <a:schemeClr val="tx1"/>
-          </a:fontRef>
-        </p:style>
-      </p:cxnSp>
-      <p:sp>
-        <p:nvSpPr>
-          <p:cNvPr id="230" name="Abgerundetes Rechteck 229"/>
-          <p:cNvSpPr/>
-          <p:nvPr/>
-        </p:nvSpPr>
-        <p:spPr>
-          <a:xfrm>
-            <a:off x="99746" y="3913316"/>
-            <a:ext cx="2088000" cy="396000"/>
-          </a:xfrm>
-          <a:prstGeom prst="roundRect">
-            <a:avLst/>
-          </a:prstGeom>
-          <a:solidFill>
-            <a:schemeClr val="bg2">
-              <a:alpha val="91000"/>
-            </a:schemeClr>
-          </a:solidFill>
-          <a:ln>
-            <a:noFill/>
-          </a:ln>
-        </p:spPr>
-        <p:style>
-          <a:lnRef idx="2">
-            <a:schemeClr val="accent1">
-              <a:shade val="50000"/>
-            </a:schemeClr>
-          </a:lnRef>
-          <a:fillRef idx="1">
-            <a:schemeClr val="accent1"/>
-          </a:fillRef>
-          <a:effectRef idx="0">
-            <a:schemeClr val="accent1"/>
-          </a:effectRef>
-          <a:fontRef idx="minor">
-            <a:schemeClr val="lt1"/>
-          </a:fontRef>
-        </p:style>
-        <p:txBody>
-          <a:bodyPr lIns="36000" tIns="36000" rIns="36000" bIns="36000" rtlCol="0" anchor="ctr"/>
-          <a:lstStyle/>
-          <a:p>
-            <a:pPr algn="ctr"/>
-            <a:r>
-              <a:rPr lang="de-DE" sz="3200">
-                <a:solidFill>
                   <a:schemeClr val="accent2"/>
                 </a:solidFill>
               </a:rPr>
@@ -4467,47 +4257,6 @@
           </a:p>
         </p:txBody>
       </p:sp>
-      <p:cxnSp>
-        <p:nvCxnSpPr>
-          <p:cNvPr id="231" name="Gerade Verbindung mit Pfeil 230"/>
-          <p:cNvCxnSpPr>
-            <a:stCxn id="230" idx="3"/>
-            <a:endCxn id="228" idx="1"/>
-          </p:cNvCxnSpPr>
-          <p:nvPr/>
-        </p:nvCxnSpPr>
-        <p:spPr>
-          <a:xfrm>
-            <a:off x="2187756" y="4111319"/>
-            <a:ext cx="258999" cy="3186"/>
-          </a:xfrm>
-          <a:prstGeom prst="straightConnector1">
-            <a:avLst/>
-          </a:prstGeom>
-          <a:ln>
-            <a:solidFill>
-              <a:schemeClr val="bg1">
-                <a:lumMod val="50000"/>
-              </a:schemeClr>
-            </a:solidFill>
-            <a:tailEnd type="triangle"/>
-          </a:ln>
-        </p:spPr>
-        <p:style>
-          <a:lnRef idx="1">
-            <a:schemeClr val="accent2"/>
-          </a:lnRef>
-          <a:fillRef idx="0">
-            <a:schemeClr val="accent2"/>
-          </a:fillRef>
-          <a:effectRef idx="0">
-            <a:schemeClr val="accent2"/>
-          </a:effectRef>
-          <a:fontRef idx="minor">
-            <a:schemeClr val="tx1"/>
-          </a:fontRef>
-        </p:style>
-      </p:cxnSp>
       <p:cxnSp>
         <p:nvCxnSpPr>
           <p:cNvPr id="232" name="Gerade Verbindung mit Pfeil 231"/>
@@ -4981,8 +4730,8 @@
         </p:nvSpPr>
         <p:spPr>
           <a:xfrm>
-            <a:off x="5165994" y="2983317"/>
-            <a:ext cx="1261884" cy="369332"/>
+            <a:off x="5450480" y="2983317"/>
+            <a:ext cx="681597" cy="369332"/>
           </a:xfrm>
           <a:prstGeom prst="rect">
             <a:avLst/>
@@ -5005,12 +4754,462 @@
           <a:lstStyle/>
           <a:p>
             <a:r>
+              <a:rPr lang="de-DE" b="1" smtClean="0"/>
+              <a:t>url(s</a:t>
+            </a:r>
+            <a:r>
               <a:rPr lang="de-DE" b="1"/>
-              <a:t>filename(s)</a:t>
-            </a:r>
-          </a:p>
-        </p:txBody>
-      </p:sp>
+              <a:t>)</a:t>
+            </a:r>
+          </a:p>
+        </p:txBody>
+      </p:sp>
+      <p:sp>
+        <p:nvSpPr>
+          <p:cNvPr id="43" name="Abgerundetes Rechteck 42"/>
+          <p:cNvSpPr/>
+          <p:nvPr/>
+        </p:nvSpPr>
+        <p:spPr>
+          <a:xfrm>
+            <a:off x="6282260" y="1894191"/>
+            <a:ext cx="2606027" cy="396000"/>
+          </a:xfrm>
+          <a:prstGeom prst="roundRect">
+            <a:avLst/>
+          </a:prstGeom>
+          <a:solidFill>
+            <a:schemeClr val="bg2">
+              <a:alpha val="91000"/>
+            </a:schemeClr>
+          </a:solidFill>
+          <a:ln>
+            <a:noFill/>
+          </a:ln>
+        </p:spPr>
+        <p:style>
+          <a:lnRef idx="2">
+            <a:schemeClr val="accent1">
+              <a:shade val="50000"/>
+            </a:schemeClr>
+          </a:lnRef>
+          <a:fillRef idx="1">
+            <a:schemeClr val="accent1"/>
+          </a:fillRef>
+          <a:effectRef idx="0">
+            <a:schemeClr val="accent1"/>
+          </a:effectRef>
+          <a:fontRef idx="minor">
+            <a:schemeClr val="lt1"/>
+          </a:fontRef>
+        </p:style>
+        <p:txBody>
+          <a:bodyPr lIns="36000" tIns="36000" rIns="36000" bIns="36000" rtlCol="0" anchor="ctr"/>
+          <a:lstStyle/>
+          <a:p>
+            <a:pPr algn="ctr"/>
+            <a:r>
+              <a:rPr lang="de-DE" sz="3200">
+                <a:solidFill>
+                  <a:schemeClr val="accent5"/>
+                </a:solidFill>
+              </a:rPr>
+              <a:t>nearbyStations</a:t>
+            </a:r>
+            <a:endParaRPr lang="de-DE" sz="3200">
+              <a:solidFill>
+                <a:schemeClr val="accent5"/>
+              </a:solidFill>
+            </a:endParaRPr>
+          </a:p>
+        </p:txBody>
+      </p:sp>
+      <p:sp>
+        <p:nvSpPr>
+          <p:cNvPr id="44" name="Abgerundetes Rechteck 43"/>
+          <p:cNvSpPr/>
+          <p:nvPr/>
+        </p:nvSpPr>
+        <p:spPr>
+          <a:xfrm>
+            <a:off x="99746" y="4065050"/>
+            <a:ext cx="2088000" cy="396000"/>
+          </a:xfrm>
+          <a:prstGeom prst="roundRect">
+            <a:avLst/>
+          </a:prstGeom>
+          <a:solidFill>
+            <a:schemeClr val="accent4">
+              <a:lumMod val="20000"/>
+              <a:lumOff val="80000"/>
+              <a:alpha val="91000"/>
+            </a:schemeClr>
+          </a:solidFill>
+          <a:ln>
+            <a:noFill/>
+          </a:ln>
+        </p:spPr>
+        <p:style>
+          <a:lnRef idx="2">
+            <a:schemeClr val="accent1">
+              <a:shade val="50000"/>
+            </a:schemeClr>
+          </a:lnRef>
+          <a:fillRef idx="1">
+            <a:schemeClr val="accent1"/>
+          </a:fillRef>
+          <a:effectRef idx="0">
+            <a:schemeClr val="accent1"/>
+          </a:effectRef>
+          <a:fontRef idx="minor">
+            <a:schemeClr val="lt1"/>
+          </a:fontRef>
+        </p:style>
+        <p:txBody>
+          <a:bodyPr lIns="36000" tIns="36000" rIns="36000" bIns="36000" rtlCol="0" anchor="ctr"/>
+          <a:lstStyle/>
+          <a:p>
+            <a:pPr algn="ctr"/>
+            <a:r>
+              <a:rPr lang="de-DE" sz="2400">
+                <a:solidFill>
+                  <a:schemeClr val="accent6">
+                    <a:lumMod val="60000"/>
+                    <a:lumOff val="40000"/>
+                  </a:schemeClr>
+                </a:solidFill>
+              </a:rPr>
+              <a:t>i</a:t>
+            </a:r>
+            <a:r>
+              <a:rPr lang="de-DE" sz="2400" smtClean="0">
+                <a:solidFill>
+                  <a:schemeClr val="accent6">
+                    <a:lumMod val="60000"/>
+                    <a:lumOff val="40000"/>
+                  </a:schemeClr>
+                </a:solidFill>
+              </a:rPr>
+              <a:t>nteractive map</a:t>
+            </a:r>
+            <a:endParaRPr lang="de-DE" sz="2400">
+              <a:solidFill>
+                <a:schemeClr val="accent6">
+                  <a:lumMod val="60000"/>
+                  <a:lumOff val="40000"/>
+                </a:schemeClr>
+              </a:solidFill>
+            </a:endParaRPr>
+          </a:p>
+        </p:txBody>
+      </p:sp>
+      <p:sp>
+        <p:nvSpPr>
+          <p:cNvPr id="216" name="Rechteck 215"/>
+          <p:cNvSpPr/>
+          <p:nvPr/>
+        </p:nvSpPr>
+        <p:spPr>
+          <a:xfrm>
+            <a:off x="4477511" y="838405"/>
+            <a:ext cx="1699452" cy="1200329"/>
+          </a:xfrm>
+          <a:prstGeom prst="rect">
+            <a:avLst/>
+          </a:prstGeom>
+          <a:solidFill>
+            <a:schemeClr val="bg1"/>
+          </a:solidFill>
+          <a:ln>
+            <a:solidFill>
+              <a:schemeClr val="bg1">
+                <a:lumMod val="50000"/>
+              </a:schemeClr>
+            </a:solidFill>
+          </a:ln>
+        </p:spPr>
+        <p:txBody>
+          <a:bodyPr wrap="square">
+            <a:spAutoFit/>
+          </a:bodyPr>
+          <a:lstStyle/>
+          <a:p>
+            <a:r>
+              <a:rPr lang="de-DE" b="1" smtClean="0"/>
+              <a:t>  id</a:t>
+            </a:r>
+            <a:r>
+              <a:rPr lang="de-DE" smtClean="0"/>
+              <a:t> </a:t>
+            </a:r>
+            <a:r>
+              <a:rPr lang="de-DE"/>
+              <a:t>/ name,</a:t>
+            </a:r>
+          </a:p>
+          <a:p>
+            <a:r>
+              <a:rPr lang="de-DE" b="1" smtClean="0"/>
+              <a:t>res</a:t>
+            </a:r>
+            <a:r>
+              <a:rPr lang="de-DE" b="1"/>
+              <a:t>, var, per</a:t>
+            </a:r>
+            <a:r>
+              <a:rPr lang="de-DE"/>
+              <a:t>,</a:t>
+            </a:r>
+          </a:p>
+          <a:p>
+            <a:r>
+              <a:rPr lang="de-DE" smtClean="0"/>
+              <a:t>base, findex</a:t>
+            </a:r>
+            <a:r>
+              <a:rPr lang="de-DE"/>
+              <a:t>,</a:t>
+            </a:r>
+          </a:p>
+          <a:p>
+            <a:r>
+              <a:rPr lang="de-DE" smtClean="0"/>
+              <a:t>current?, </a:t>
+            </a:r>
+            <a:r>
+              <a:rPr lang="de-DE" b="1" smtClean="0"/>
+              <a:t>meta</a:t>
+            </a:r>
+            <a:r>
+              <a:rPr lang="de-DE" b="1"/>
+              <a:t>?</a:t>
+            </a:r>
+          </a:p>
+        </p:txBody>
+      </p:sp>
+      <p:sp>
+        <p:nvSpPr>
+          <p:cNvPr id="45" name="Rechteck 44"/>
+          <p:cNvSpPr/>
+          <p:nvPr/>
+        </p:nvSpPr>
+        <p:spPr>
+          <a:xfrm>
+            <a:off x="6735547" y="838475"/>
+            <a:ext cx="1699452" cy="923330"/>
+          </a:xfrm>
+          <a:prstGeom prst="rect">
+            <a:avLst/>
+          </a:prstGeom>
+          <a:solidFill>
+            <a:schemeClr val="bg1"/>
+          </a:solidFill>
+          <a:ln>
+            <a:solidFill>
+              <a:schemeClr val="bg1">
+                <a:lumMod val="50000"/>
+              </a:schemeClr>
+            </a:solidFill>
+          </a:ln>
+        </p:spPr>
+        <p:txBody>
+          <a:bodyPr wrap="square">
+            <a:spAutoFit/>
+          </a:bodyPr>
+          <a:lstStyle/>
+          <a:p>
+            <a:r>
+              <a:rPr lang="de-DE" b="1" smtClean="0"/>
+              <a:t>lat, lon, radius</a:t>
+            </a:r>
+            <a:r>
+              <a:rPr lang="de-DE" smtClean="0"/>
+              <a:t>,</a:t>
+            </a:r>
+            <a:endParaRPr lang="de-DE"/>
+          </a:p>
+          <a:p>
+            <a:r>
+              <a:rPr lang="de-DE" smtClean="0"/>
+              <a:t>res</a:t>
+            </a:r>
+            <a:r>
+              <a:rPr lang="de-DE"/>
+              <a:t>, var, per,</a:t>
+            </a:r>
+          </a:p>
+          <a:p>
+            <a:r>
+              <a:rPr lang="de-DE" smtClean="0"/>
+              <a:t>mindate</a:t>
+            </a:r>
+            <a:endParaRPr lang="de-DE" b="1"/>
+          </a:p>
+        </p:txBody>
+      </p:sp>
+      <p:cxnSp>
+        <p:nvCxnSpPr>
+          <p:cNvPr id="46" name="Gerade Verbindung mit Pfeil 45"/>
+          <p:cNvCxnSpPr>
+            <a:stCxn id="228" idx="1"/>
+            <a:endCxn id="44" idx="3"/>
+          </p:cNvCxnSpPr>
+          <p:nvPr/>
+        </p:nvCxnSpPr>
+        <p:spPr>
+          <a:xfrm flipH="1">
+            <a:off x="2187746" y="4114502"/>
+            <a:ext cx="258999" cy="148548"/>
+          </a:xfrm>
+          <a:prstGeom prst="straightConnector1">
+            <a:avLst/>
+          </a:prstGeom>
+          <a:ln>
+            <a:solidFill>
+              <a:schemeClr val="bg1">
+                <a:lumMod val="50000"/>
+              </a:schemeClr>
+            </a:solidFill>
+            <a:tailEnd type="triangle"/>
+          </a:ln>
+        </p:spPr>
+        <p:style>
+          <a:lnRef idx="1">
+            <a:schemeClr val="accent2"/>
+          </a:lnRef>
+          <a:fillRef idx="0">
+            <a:schemeClr val="accent2"/>
+          </a:fillRef>
+          <a:effectRef idx="0">
+            <a:schemeClr val="accent2"/>
+          </a:effectRef>
+          <a:fontRef idx="minor">
+            <a:schemeClr val="tx1"/>
+          </a:fontRef>
+        </p:style>
+      </p:cxnSp>
+      <p:cxnSp>
+        <p:nvCxnSpPr>
+          <p:cNvPr id="227" name="Gerade Verbindung mit Pfeil 226"/>
+          <p:cNvCxnSpPr>
+            <a:stCxn id="220" idx="3"/>
+          </p:cNvCxnSpPr>
+          <p:nvPr/>
+        </p:nvCxnSpPr>
+        <p:spPr>
+          <a:xfrm>
+            <a:off x="4024219" y="1030761"/>
+            <a:ext cx="621112" cy="0"/>
+          </a:xfrm>
+          <a:prstGeom prst="straightConnector1">
+            <a:avLst/>
+          </a:prstGeom>
+          <a:ln>
+            <a:solidFill>
+              <a:schemeClr val="bg1">
+                <a:lumMod val="50000"/>
+              </a:schemeClr>
+            </a:solidFill>
+            <a:tailEnd type="triangle"/>
+          </a:ln>
+        </p:spPr>
+        <p:style>
+          <a:lnRef idx="1">
+            <a:schemeClr val="accent2"/>
+          </a:lnRef>
+          <a:fillRef idx="0">
+            <a:schemeClr val="accent2"/>
+          </a:fillRef>
+          <a:effectRef idx="0">
+            <a:schemeClr val="accent2"/>
+          </a:effectRef>
+          <a:fontRef idx="minor">
+            <a:schemeClr val="tx1"/>
+          </a:fontRef>
+        </p:style>
+      </p:cxnSp>
+      <p:cxnSp>
+        <p:nvCxnSpPr>
+          <p:cNvPr id="61" name="Gerade Verbindung mit Pfeil 60"/>
+          <p:cNvCxnSpPr>
+            <a:stCxn id="45" idx="2"/>
+            <a:endCxn id="43" idx="0"/>
+          </p:cNvCxnSpPr>
+          <p:nvPr/>
+        </p:nvCxnSpPr>
+        <p:spPr>
+          <a:xfrm>
+            <a:off x="7585273" y="1761805"/>
+            <a:ext cx="1" cy="132386"/>
+          </a:xfrm>
+          <a:prstGeom prst="straightConnector1">
+            <a:avLst/>
+          </a:prstGeom>
+          <a:ln>
+            <a:solidFill>
+              <a:schemeClr val="bg1">
+                <a:lumMod val="50000"/>
+              </a:schemeClr>
+            </a:solidFill>
+            <a:tailEnd type="triangle"/>
+          </a:ln>
+        </p:spPr>
+        <p:style>
+          <a:lnRef idx="1">
+            <a:schemeClr val="accent1"/>
+          </a:lnRef>
+          <a:fillRef idx="0">
+            <a:schemeClr val="accent1"/>
+          </a:fillRef>
+          <a:effectRef idx="0">
+            <a:schemeClr val="accent1"/>
+          </a:effectRef>
+          <a:fontRef idx="minor">
+            <a:schemeClr val="tx1"/>
+          </a:fontRef>
+        </p:style>
+      </p:cxnSp>
+      <p:cxnSp>
+        <p:nvCxnSpPr>
+          <p:cNvPr id="64" name="Gerade Verbindung mit Pfeil 63"/>
+          <p:cNvCxnSpPr>
+            <a:stCxn id="43" idx="2"/>
+            <a:endCxn id="242" idx="3"/>
+          </p:cNvCxnSpPr>
+          <p:nvPr/>
+        </p:nvCxnSpPr>
+        <p:spPr>
+          <a:xfrm flipH="1">
+            <a:off x="6132077" y="2290191"/>
+            <a:ext cx="1453197" cy="877792"/>
+          </a:xfrm>
+          <a:prstGeom prst="straightConnector1">
+            <a:avLst/>
+          </a:prstGeom>
+          <a:ln>
+            <a:solidFill>
+              <a:schemeClr val="bg1">
+                <a:lumMod val="50000"/>
+              </a:schemeClr>
+            </a:solidFill>
+            <a:tailEnd type="triangle"/>
+          </a:ln>
+        </p:spPr>
+        <p:style>
+          <a:lnRef idx="1">
+            <a:schemeClr val="accent1"/>
+          </a:lnRef>
+          <a:fillRef idx="0">
+            <a:schemeClr val="accent1"/>
+          </a:fillRef>
+          <a:effectRef idx="0">
+            <a:schemeClr val="accent1"/>
+          </a:effectRef>
+          <a:fontRef idx="minor">
+            <a:schemeClr val="tx1"/>
+          </a:fontRef>
+        </p:style>
+      </p:cxnSp>
     </p:spTree>
     <p:extLst>
       <p:ext uri="{BB962C8B-B14F-4D97-AF65-F5344CB8AC3E}">

</xml_diff>

<commit_message>
geoIndexAll removed, createIndex updated for new FTP metadata structure, indexes updated, vignettes updated
</commit_message>
<xml_diff>
--- a/vignettes/PackageSchematic.pptx
+++ b/vignettes/PackageSchematic.pptx
@@ -106,13 +106,23 @@
   </p:defaultTextStyle>
   <p:extLst>
     <p:ext uri="{EFAFB233-063F-42B5-8137-9DF3F51BA10A}">
-      <p15:sldGuideLst xmlns:p15="http://schemas.microsoft.com/office/powerpoint/2012/main" xmlns="">
+      <p15:sldGuideLst xmlns:p15="http://schemas.microsoft.com/office/powerpoint/2012/main">
         <p15:guide id="1" orient="horz" pos="1757" userDrawn="1">
           <p15:clr>
             <a:srgbClr val="A4A3A4"/>
           </p15:clr>
         </p15:guide>
         <p15:guide id="2" pos="2880" userDrawn="1">
+          <p15:clr>
+            <a:srgbClr val="A4A3A4"/>
+          </p15:clr>
+        </p15:guide>
+        <p15:guide id="3" orient="horz" pos="1475">
+          <p15:clr>
+            <a:srgbClr val="A4A3A4"/>
+          </p15:clr>
+        </p15:guide>
+        <p15:guide id="4" pos="2835">
           <p15:clr>
             <a:srgbClr val="A4A3A4"/>
           </p15:clr>
@@ -254,7 +264,7 @@
           <a:p>
             <a:fld id="{300DB245-849F-4AAA-AD3E-676A6FA9CB3B}" type="datetimeFigureOut">
               <a:rPr lang="de-DE" smtClean="0"/>
-              <a:t>25.03.2017</a:t>
+              <a:t>08.06.2017</a:t>
             </a:fld>
             <a:endParaRPr lang="de-DE"/>
           </a:p>
@@ -424,7 +434,7 @@
           <a:p>
             <a:fld id="{300DB245-849F-4AAA-AD3E-676A6FA9CB3B}" type="datetimeFigureOut">
               <a:rPr lang="de-DE" smtClean="0"/>
-              <a:t>25.03.2017</a:t>
+              <a:t>08.06.2017</a:t>
             </a:fld>
             <a:endParaRPr lang="de-DE"/>
           </a:p>
@@ -604,7 +614,7 @@
           <a:p>
             <a:fld id="{300DB245-849F-4AAA-AD3E-676A6FA9CB3B}" type="datetimeFigureOut">
               <a:rPr lang="de-DE" smtClean="0"/>
-              <a:t>25.03.2017</a:t>
+              <a:t>08.06.2017</a:t>
             </a:fld>
             <a:endParaRPr lang="de-DE"/>
           </a:p>
@@ -774,7 +784,7 @@
           <a:p>
             <a:fld id="{300DB245-849F-4AAA-AD3E-676A6FA9CB3B}" type="datetimeFigureOut">
               <a:rPr lang="de-DE" smtClean="0"/>
-              <a:t>25.03.2017</a:t>
+              <a:t>08.06.2017</a:t>
             </a:fld>
             <a:endParaRPr lang="de-DE"/>
           </a:p>
@@ -1020,7 +1030,7 @@
           <a:p>
             <a:fld id="{300DB245-849F-4AAA-AD3E-676A6FA9CB3B}" type="datetimeFigureOut">
               <a:rPr lang="de-DE" smtClean="0"/>
-              <a:t>25.03.2017</a:t>
+              <a:t>08.06.2017</a:t>
             </a:fld>
             <a:endParaRPr lang="de-DE"/>
           </a:p>
@@ -1252,7 +1262,7 @@
           <a:p>
             <a:fld id="{300DB245-849F-4AAA-AD3E-676A6FA9CB3B}" type="datetimeFigureOut">
               <a:rPr lang="de-DE" smtClean="0"/>
-              <a:t>25.03.2017</a:t>
+              <a:t>08.06.2017</a:t>
             </a:fld>
             <a:endParaRPr lang="de-DE"/>
           </a:p>
@@ -1619,7 +1629,7 @@
           <a:p>
             <a:fld id="{300DB245-849F-4AAA-AD3E-676A6FA9CB3B}" type="datetimeFigureOut">
               <a:rPr lang="de-DE" smtClean="0"/>
-              <a:t>25.03.2017</a:t>
+              <a:t>08.06.2017</a:t>
             </a:fld>
             <a:endParaRPr lang="de-DE"/>
           </a:p>
@@ -1737,7 +1747,7 @@
           <a:p>
             <a:fld id="{300DB245-849F-4AAA-AD3E-676A6FA9CB3B}" type="datetimeFigureOut">
               <a:rPr lang="de-DE" smtClean="0"/>
-              <a:t>25.03.2017</a:t>
+              <a:t>08.06.2017</a:t>
             </a:fld>
             <a:endParaRPr lang="de-DE"/>
           </a:p>
@@ -1832,7 +1842,7 @@
           <a:p>
             <a:fld id="{300DB245-849F-4AAA-AD3E-676A6FA9CB3B}" type="datetimeFigureOut">
               <a:rPr lang="de-DE" smtClean="0"/>
-              <a:t>25.03.2017</a:t>
+              <a:t>08.06.2017</a:t>
             </a:fld>
             <a:endParaRPr lang="de-DE"/>
           </a:p>
@@ -2109,7 +2119,7 @@
           <a:p>
             <a:fld id="{300DB245-849F-4AAA-AD3E-676A6FA9CB3B}" type="datetimeFigureOut">
               <a:rPr lang="de-DE" smtClean="0"/>
-              <a:t>25.03.2017</a:t>
+              <a:t>08.06.2017</a:t>
             </a:fld>
             <a:endParaRPr lang="de-DE"/>
           </a:p>
@@ -2366,7 +2376,7 @@
           <a:p>
             <a:fld id="{300DB245-849F-4AAA-AD3E-676A6FA9CB3B}" type="datetimeFigureOut">
               <a:rPr lang="de-DE" smtClean="0"/>
-              <a:t>25.03.2017</a:t>
+              <a:t>08.06.2017</a:t>
             </a:fld>
             <a:endParaRPr lang="de-DE"/>
           </a:p>
@@ -2579,7 +2589,7 @@
           <a:p>
             <a:fld id="{300DB245-849F-4AAA-AD3E-676A6FA9CB3B}" type="datetimeFigureOut">
               <a:rPr lang="de-DE" smtClean="0"/>
-              <a:t>25.03.2017</a:t>
+              <a:t>08.06.2017</a:t>
             </a:fld>
             <a:endParaRPr lang="de-DE"/>
           </a:p>
@@ -3809,8 +3819,8 @@
         </p:nvSpPr>
         <p:spPr>
           <a:xfrm>
-            <a:off x="2455364" y="3305962"/>
-            <a:ext cx="2088000" cy="396000"/>
+            <a:off x="2455364" y="3305961"/>
+            <a:ext cx="2088000" cy="449351"/>
           </a:xfrm>
           <a:prstGeom prst="roundRect">
             <a:avLst/>
@@ -3841,7 +3851,7 @@
           </a:fontRef>
         </p:style>
         <p:txBody>
-          <a:bodyPr lIns="36000" tIns="36000" rIns="36000" bIns="36000" rtlCol="0" anchor="ctr"/>
+          <a:bodyPr lIns="36000" tIns="0" rIns="36000" bIns="72000" rtlCol="0" anchor="ctr"/>
           <a:lstStyle/>
           <a:p>
             <a:pPr algn="ctr"/>
@@ -3854,7 +3864,7 @@
                   </a:schemeClr>
                 </a:solidFill>
               </a:rPr>
-              <a:t>geoIndexAll</a:t>
+              <a:t>geoIndex</a:t>
             </a:r>
             <a:endParaRPr lang="de-DE" sz="3200">
               <a:solidFill>
@@ -4065,8 +4075,8 @@
         </p:nvCxnSpPr>
         <p:spPr>
           <a:xfrm>
-            <a:off x="2187746" y="2995967"/>
-            <a:ext cx="267618" cy="507992"/>
+            <a:off x="2187746" y="2995969"/>
+            <a:ext cx="267618" cy="534668"/>
           </a:xfrm>
           <a:prstGeom prst="straightConnector1">
             <a:avLst/>
@@ -4095,85 +4105,19 @@
           </a:fontRef>
         </p:style>
       </p:cxnSp>
-      <p:sp>
-        <p:nvSpPr>
-          <p:cNvPr id="228" name="Abgerundetes Rechteck 227"/>
-          <p:cNvSpPr/>
-          <p:nvPr/>
-        </p:nvSpPr>
-        <p:spPr>
-          <a:xfrm>
-            <a:off x="2446745" y="3916502"/>
-            <a:ext cx="2088000" cy="396000"/>
-          </a:xfrm>
-          <a:prstGeom prst="roundRect">
-            <a:avLst/>
-          </a:prstGeom>
-          <a:solidFill>
-            <a:schemeClr val="bg2">
-              <a:alpha val="91000"/>
-            </a:schemeClr>
-          </a:solidFill>
-          <a:ln>
-            <a:noFill/>
-          </a:ln>
-        </p:spPr>
-        <p:style>
-          <a:lnRef idx="2">
-            <a:schemeClr val="accent1">
-              <a:shade val="50000"/>
-            </a:schemeClr>
-          </a:lnRef>
-          <a:fillRef idx="1">
-            <a:schemeClr val="accent1"/>
-          </a:fillRef>
-          <a:effectRef idx="0">
-            <a:schemeClr val="accent1"/>
-          </a:effectRef>
-          <a:fontRef idx="minor">
-            <a:schemeClr val="lt1"/>
-          </a:fontRef>
-        </p:style>
-        <p:txBody>
-          <a:bodyPr lIns="36000" tIns="36000" rIns="36000" bIns="36000" rtlCol="0" anchor="ctr"/>
-          <a:lstStyle/>
-          <a:p>
-            <a:pPr algn="ctr"/>
-            <a:r>
-              <a:rPr lang="de-DE" sz="3200">
-                <a:solidFill>
-                  <a:schemeClr val="accent6">
-                    <a:lumMod val="60000"/>
-                    <a:lumOff val="40000"/>
-                  </a:schemeClr>
-                </a:solidFill>
-              </a:rPr>
-              <a:t>geoIndex</a:t>
-            </a:r>
-            <a:endParaRPr lang="de-DE" sz="3200">
-              <a:solidFill>
-                <a:schemeClr val="accent6">
-                  <a:lumMod val="60000"/>
-                  <a:lumOff val="40000"/>
-                </a:schemeClr>
-              </a:solidFill>
-            </a:endParaRPr>
-          </a:p>
-        </p:txBody>
-      </p:sp>
       <p:cxnSp>
         <p:nvCxnSpPr>
           <p:cNvPr id="229" name="Gerade Verbindung mit Pfeil 228"/>
           <p:cNvCxnSpPr>
             <a:stCxn id="219" idx="2"/>
-            <a:endCxn id="228" idx="0"/>
+            <a:endCxn id="44" idx="0"/>
           </p:cNvCxnSpPr>
           <p:nvPr/>
         </p:nvCxnSpPr>
         <p:spPr>
-          <a:xfrm flipH="1">
-            <a:off x="3490755" y="3701963"/>
-            <a:ext cx="8619" cy="214541"/>
+          <a:xfrm>
+            <a:off x="3499364" y="3755312"/>
+            <a:ext cx="0" cy="312375"/>
           </a:xfrm>
           <a:prstGeom prst="straightConnector1">
             <a:avLst/>
@@ -4804,7 +4748,7 @@
           </a:fontRef>
         </p:style>
         <p:txBody>
-          <a:bodyPr lIns="36000" tIns="36000" rIns="36000" bIns="36000" rtlCol="0" anchor="ctr"/>
+          <a:bodyPr lIns="36000" tIns="36000" rIns="36000" bIns="72000" rtlCol="0" anchor="ctr"/>
           <a:lstStyle/>
           <a:p>
             <a:pPr algn="ctr"/>
@@ -4816,11 +4760,6 @@
               </a:rPr>
               <a:t>nearbyStations</a:t>
             </a:r>
-            <a:endParaRPr lang="de-DE" sz="3200">
-              <a:solidFill>
-                <a:schemeClr val="accent5"/>
-              </a:solidFill>
-            </a:endParaRPr>
           </a:p>
         </p:txBody>
       </p:sp>
@@ -4832,7 +4771,7 @@
         </p:nvSpPr>
         <p:spPr>
           <a:xfrm>
-            <a:off x="99746" y="4065050"/>
+            <a:off x="2455364" y="4067687"/>
             <a:ext cx="2088000" cy="396000"/>
           </a:xfrm>
           <a:prstGeom prst="roundRect">
@@ -5047,47 +4986,6 @@
           </a:p>
         </p:txBody>
       </p:sp>
-      <p:cxnSp>
-        <p:nvCxnSpPr>
-          <p:cNvPr id="46" name="Gerade Verbindung mit Pfeil 45"/>
-          <p:cNvCxnSpPr>
-            <a:stCxn id="228" idx="1"/>
-            <a:endCxn id="44" idx="3"/>
-          </p:cNvCxnSpPr>
-          <p:nvPr/>
-        </p:nvCxnSpPr>
-        <p:spPr>
-          <a:xfrm flipH="1">
-            <a:off x="2187746" y="4114502"/>
-            <a:ext cx="258999" cy="148548"/>
-          </a:xfrm>
-          <a:prstGeom prst="straightConnector1">
-            <a:avLst/>
-          </a:prstGeom>
-          <a:ln>
-            <a:solidFill>
-              <a:schemeClr val="bg1">
-                <a:lumMod val="50000"/>
-              </a:schemeClr>
-            </a:solidFill>
-            <a:tailEnd type="triangle"/>
-          </a:ln>
-        </p:spPr>
-        <p:style>
-          <a:lnRef idx="1">
-            <a:schemeClr val="accent2"/>
-          </a:lnRef>
-          <a:fillRef idx="0">
-            <a:schemeClr val="accent2"/>
-          </a:fillRef>
-          <a:effectRef idx="0">
-            <a:schemeClr val="accent2"/>
-          </a:effectRef>
-          <a:fontRef idx="minor">
-            <a:schemeClr val="tx1"/>
-          </a:fontRef>
-        </p:style>
-      </p:cxnSp>
       <p:cxnSp>
         <p:nvCxnSpPr>
           <p:cNvPr id="227" name="Gerade Verbindung mit Pfeil 226"/>
@@ -5478,7 +5376,7 @@
   <a:extraClrSchemeLst/>
   <a:extLst>
     <a:ext uri="{05A4C25C-085E-4340-85A3-A5531E510DB2}">
-      <thm15:themeFamily xmlns:thm15="http://schemas.microsoft.com/office/thememl/2012/main" xmlns="" name="Office Theme" id="{62F939B6-93AF-4DB8-9C6B-D6C7DFDC589F}" vid="{4A3C46E8-61CC-4603-A589-7422A47A8E4A}"/>
+      <thm15:themeFamily xmlns:thm15="http://schemas.microsoft.com/office/thememl/2012/main" name="Office Theme" id="{62F939B6-93AF-4DB8-9C6B-D6C7DFDC589F}" vid="{4A3C46E8-61CC-4603-A589-7422A47A8E4A}"/>
     </a:ext>
   </a:extLst>
 </a:theme>

</xml_diff>

<commit_message>
indexDWD: renamed to indexFTP
</commit_message>
<xml_diff>
--- a/vignettes/PackageSchematic.pptx
+++ b/vignettes/PackageSchematic.pptx
@@ -264,7 +264,7 @@
           <a:p>
             <a:fld id="{300DB245-849F-4AAA-AD3E-676A6FA9CB3B}" type="datetimeFigureOut">
               <a:rPr lang="de-DE" smtClean="0"/>
-              <a:t>08.06.2017</a:t>
+              <a:t>09.06.2017</a:t>
             </a:fld>
             <a:endParaRPr lang="de-DE"/>
           </a:p>
@@ -434,7 +434,7 @@
           <a:p>
             <a:fld id="{300DB245-849F-4AAA-AD3E-676A6FA9CB3B}" type="datetimeFigureOut">
               <a:rPr lang="de-DE" smtClean="0"/>
-              <a:t>08.06.2017</a:t>
+              <a:t>09.06.2017</a:t>
             </a:fld>
             <a:endParaRPr lang="de-DE"/>
           </a:p>
@@ -614,7 +614,7 @@
           <a:p>
             <a:fld id="{300DB245-849F-4AAA-AD3E-676A6FA9CB3B}" type="datetimeFigureOut">
               <a:rPr lang="de-DE" smtClean="0"/>
-              <a:t>08.06.2017</a:t>
+              <a:t>09.06.2017</a:t>
             </a:fld>
             <a:endParaRPr lang="de-DE"/>
           </a:p>
@@ -784,7 +784,7 @@
           <a:p>
             <a:fld id="{300DB245-849F-4AAA-AD3E-676A6FA9CB3B}" type="datetimeFigureOut">
               <a:rPr lang="de-DE" smtClean="0"/>
-              <a:t>08.06.2017</a:t>
+              <a:t>09.06.2017</a:t>
             </a:fld>
             <a:endParaRPr lang="de-DE"/>
           </a:p>
@@ -1030,7 +1030,7 @@
           <a:p>
             <a:fld id="{300DB245-849F-4AAA-AD3E-676A6FA9CB3B}" type="datetimeFigureOut">
               <a:rPr lang="de-DE" smtClean="0"/>
-              <a:t>08.06.2017</a:t>
+              <a:t>09.06.2017</a:t>
             </a:fld>
             <a:endParaRPr lang="de-DE"/>
           </a:p>
@@ -1262,7 +1262,7 @@
           <a:p>
             <a:fld id="{300DB245-849F-4AAA-AD3E-676A6FA9CB3B}" type="datetimeFigureOut">
               <a:rPr lang="de-DE" smtClean="0"/>
-              <a:t>08.06.2017</a:t>
+              <a:t>09.06.2017</a:t>
             </a:fld>
             <a:endParaRPr lang="de-DE"/>
           </a:p>
@@ -1629,7 +1629,7 @@
           <a:p>
             <a:fld id="{300DB245-849F-4AAA-AD3E-676A6FA9CB3B}" type="datetimeFigureOut">
               <a:rPr lang="de-DE" smtClean="0"/>
-              <a:t>08.06.2017</a:t>
+              <a:t>09.06.2017</a:t>
             </a:fld>
             <a:endParaRPr lang="de-DE"/>
           </a:p>
@@ -1747,7 +1747,7 @@
           <a:p>
             <a:fld id="{300DB245-849F-4AAA-AD3E-676A6FA9CB3B}" type="datetimeFigureOut">
               <a:rPr lang="de-DE" smtClean="0"/>
-              <a:t>08.06.2017</a:t>
+              <a:t>09.06.2017</a:t>
             </a:fld>
             <a:endParaRPr lang="de-DE"/>
           </a:p>
@@ -1842,7 +1842,7 @@
           <a:p>
             <a:fld id="{300DB245-849F-4AAA-AD3E-676A6FA9CB3B}" type="datetimeFigureOut">
               <a:rPr lang="de-DE" smtClean="0"/>
-              <a:t>08.06.2017</a:t>
+              <a:t>09.06.2017</a:t>
             </a:fld>
             <a:endParaRPr lang="de-DE"/>
           </a:p>
@@ -2119,7 +2119,7 @@
           <a:p>
             <a:fld id="{300DB245-849F-4AAA-AD3E-676A6FA9CB3B}" type="datetimeFigureOut">
               <a:rPr lang="de-DE" smtClean="0"/>
-              <a:t>08.06.2017</a:t>
+              <a:t>09.06.2017</a:t>
             </a:fld>
             <a:endParaRPr lang="de-DE"/>
           </a:p>
@@ -2376,7 +2376,7 @@
           <a:p>
             <a:fld id="{300DB245-849F-4AAA-AD3E-676A6FA9CB3B}" type="datetimeFigureOut">
               <a:rPr lang="de-DE" smtClean="0"/>
-              <a:t>08.06.2017</a:t>
+              <a:t>09.06.2017</a:t>
             </a:fld>
             <a:endParaRPr lang="de-DE"/>
           </a:p>
@@ -2589,7 +2589,7 @@
           <a:p>
             <a:fld id="{300DB245-849F-4AAA-AD3E-676A6FA9CB3B}" type="datetimeFigureOut">
               <a:rPr lang="de-DE" smtClean="0"/>
-              <a:t>08.06.2017</a:t>
+              <a:t>09.06.2017</a:t>
             </a:fld>
             <a:endParaRPr lang="de-DE"/>
           </a:p>
@@ -3099,12 +3099,12 @@
           <a:p>
             <a:pPr algn="ctr"/>
             <a:r>
-              <a:rPr lang="de-DE" sz="3200" err="1">
+              <a:rPr lang="de-DE" sz="3200" smtClean="0">
                 <a:solidFill>
                   <a:schemeClr val="accent2"/>
                 </a:solidFill>
               </a:rPr>
-              <a:t>indexDWD</a:t>
+              <a:t>indexFTP</a:t>
             </a:r>
             <a:endParaRPr lang="de-DE" sz="3200">
               <a:solidFill>

</xml_diff>